<commit_message>
Atualização da apresentação e da function
</commit_message>
<xml_diff>
--- a/LetsMusic.pptx
+++ b/LetsMusic.pptx
@@ -3991,12 +3991,47 @@
           </a:fontRef>
         </p:style>
       </p:cxnSp>
+      <p:sp>
+        <p:nvSpPr>
+          <p:cNvPr id="13" name="CaixaDeTexto 12">
+            <a:extLst>
+              <a:ext uri="{FF2B5EF4-FFF2-40B4-BE49-F238E27FC236}">
+                <a16:creationId xmlns:a16="http://schemas.microsoft.com/office/drawing/2014/main" id="{B006280D-E7BB-2748-5D3D-86F4036A9DB2}"/>
+              </a:ext>
+            </a:extLst>
+          </p:cNvPr>
+          <p:cNvSpPr txBox="1"/>
+          <p:nvPr/>
+        </p:nvSpPr>
+        <p:spPr>
+          <a:xfrm>
+            <a:off x="8917497" y="1551963"/>
+            <a:ext cx="1551964" cy="369332"/>
+          </a:xfrm>
+          <a:prstGeom prst="rect">
+            <a:avLst/>
+          </a:prstGeom>
+          <a:noFill/>
+        </p:spPr>
+        <p:txBody>
+          <a:bodyPr wrap="square" rtlCol="0">
+            <a:spAutoFit/>
+          </a:bodyPr>
+          <a:lstStyle/>
+          <a:p>
+            <a:r>
+              <a:rPr lang="pt-BR" dirty="0"/>
+              <a:t>FUNCTION</a:t>
+            </a:r>
+          </a:p>
+        </p:txBody>
+      </p:sp>
       <p:pic>
         <p:nvPicPr>
-          <p:cNvPr id="4" name="Imagem 3">
-            <a:extLst>
-              <a:ext uri="{FF2B5EF4-FFF2-40B4-BE49-F238E27FC236}">
-                <a16:creationId xmlns:a16="http://schemas.microsoft.com/office/drawing/2014/main" id="{FF882F78-4A26-4327-05E2-C244FD3F4C0A}"/>
+          <p:cNvPr id="5" name="Imagem 4">
+            <a:extLst>
+              <a:ext uri="{FF2B5EF4-FFF2-40B4-BE49-F238E27FC236}">
+                <a16:creationId xmlns:a16="http://schemas.microsoft.com/office/drawing/2014/main" id="{BF76C14B-E11A-002B-7FCC-FD7C75FCBAE1}"/>
               </a:ext>
             </a:extLst>
           </p:cNvPr>
@@ -4013,17 +4048,12 @@
         </p:blipFill>
         <p:spPr>
           <a:xfrm>
-            <a:off x="366216" y="1932392"/>
-            <a:ext cx="10765203" cy="4238593"/>
+            <a:off x="462651" y="1890892"/>
+            <a:ext cx="11263650" cy="3840862"/>
           </a:xfrm>
           <a:prstGeom prst="rect">
             <a:avLst/>
           </a:prstGeom>
-          <a:ln>
-            <a:solidFill>
-              <a:schemeClr val="bg1"/>
-            </a:solidFill>
-          </a:ln>
         </p:spPr>
       </p:pic>
       <p:pic>
@@ -4048,7 +4078,7 @@
         </p:blipFill>
         <p:spPr>
           <a:xfrm>
-            <a:off x="3215455" y="5878164"/>
+            <a:off x="3223844" y="5554205"/>
             <a:ext cx="8832766" cy="585642"/>
           </a:xfrm>
           <a:prstGeom prst="rect">
@@ -4083,7 +4113,7 @@
         </p:blipFill>
         <p:spPr>
           <a:xfrm>
-            <a:off x="7261247" y="6170985"/>
+            <a:off x="7236080" y="5894888"/>
             <a:ext cx="4661214" cy="489918"/>
           </a:xfrm>
           <a:prstGeom prst="rect">
@@ -4096,41 +4126,6 @@
           </a:ln>
         </p:spPr>
       </p:pic>
-      <p:sp>
-        <p:nvSpPr>
-          <p:cNvPr id="13" name="CaixaDeTexto 12">
-            <a:extLst>
-              <a:ext uri="{FF2B5EF4-FFF2-40B4-BE49-F238E27FC236}">
-                <a16:creationId xmlns:a16="http://schemas.microsoft.com/office/drawing/2014/main" id="{B006280D-E7BB-2748-5D3D-86F4036A9DB2}"/>
-              </a:ext>
-            </a:extLst>
-          </p:cNvPr>
-          <p:cNvSpPr txBox="1"/>
-          <p:nvPr/>
-        </p:nvSpPr>
-        <p:spPr>
-          <a:xfrm>
-            <a:off x="8917497" y="1551963"/>
-            <a:ext cx="1551964" cy="369332"/>
-          </a:xfrm>
-          <a:prstGeom prst="rect">
-            <a:avLst/>
-          </a:prstGeom>
-          <a:noFill/>
-        </p:spPr>
-        <p:txBody>
-          <a:bodyPr wrap="square" rtlCol="0">
-            <a:spAutoFit/>
-          </a:bodyPr>
-          <a:lstStyle/>
-          <a:p>
-            <a:r>
-              <a:rPr lang="pt-BR" dirty="0"/>
-              <a:t>FUNCTION</a:t>
-            </a:r>
-          </a:p>
-        </p:txBody>
-      </p:sp>
     </p:spTree>
     <p:extLst>
       <p:ext uri="{BB962C8B-B14F-4D97-AF65-F5344CB8AC3E}">
@@ -5087,10 +5082,10 @@
       </p:cxnSp>
       <p:pic>
         <p:nvPicPr>
-          <p:cNvPr id="4" name="Imagem 3">
-            <a:extLst>
-              <a:ext uri="{FF2B5EF4-FFF2-40B4-BE49-F238E27FC236}">
-                <a16:creationId xmlns:a16="http://schemas.microsoft.com/office/drawing/2014/main" id="{61E9E293-D3A5-6925-B640-7E65B462CE51}"/>
+          <p:cNvPr id="5" name="Imagem 4">
+            <a:extLst>
+              <a:ext uri="{FF2B5EF4-FFF2-40B4-BE49-F238E27FC236}">
+                <a16:creationId xmlns:a16="http://schemas.microsoft.com/office/drawing/2014/main" id="{BFE051CD-BCEC-D6F4-28AA-445307CE2F00}"/>
               </a:ext>
             </a:extLst>
           </p:cNvPr>
@@ -5107,8 +5102,8 @@
         </p:blipFill>
         <p:spPr>
           <a:xfrm>
-            <a:off x="890738" y="1740725"/>
-            <a:ext cx="7366853" cy="3385290"/>
+            <a:off x="890738" y="1762671"/>
+            <a:ext cx="7231405" cy="3884437"/>
           </a:xfrm>
           <a:prstGeom prst="rect">
             <a:avLst/>
@@ -5117,10 +5112,10 @@
       </p:pic>
       <p:pic>
         <p:nvPicPr>
-          <p:cNvPr id="6" name="Imagem 5">
-            <a:extLst>
-              <a:ext uri="{FF2B5EF4-FFF2-40B4-BE49-F238E27FC236}">
-                <a16:creationId xmlns:a16="http://schemas.microsoft.com/office/drawing/2014/main" id="{EA55010C-1D74-F435-74C6-8F4F7F87E0B2}"/>
+          <p:cNvPr id="8" name="Imagem 7">
+            <a:extLst>
+              <a:ext uri="{FF2B5EF4-FFF2-40B4-BE49-F238E27FC236}">
+                <a16:creationId xmlns:a16="http://schemas.microsoft.com/office/drawing/2014/main" id="{9DB2DC5F-6090-4E5E-242A-2503D6B4D60B}"/>
               </a:ext>
             </a:extLst>
           </p:cNvPr>
@@ -5137,8 +5132,8 @@
         </p:blipFill>
         <p:spPr>
           <a:xfrm>
-            <a:off x="4656492" y="4376934"/>
-            <a:ext cx="6903538" cy="2160889"/>
+            <a:off x="5007928" y="3589179"/>
+            <a:ext cx="6924013" cy="3176542"/>
           </a:xfrm>
           <a:prstGeom prst="rect">
             <a:avLst/>
@@ -5331,10 +5326,10 @@
       </p:cxnSp>
       <p:pic>
         <p:nvPicPr>
-          <p:cNvPr id="5" name="Imagem 4">
-            <a:extLst>
-              <a:ext uri="{FF2B5EF4-FFF2-40B4-BE49-F238E27FC236}">
-                <a16:creationId xmlns:a16="http://schemas.microsoft.com/office/drawing/2014/main" id="{EB121A40-9DF1-0FD5-DBBE-124615700E31}"/>
+          <p:cNvPr id="4" name="Imagem 3">
+            <a:extLst>
+              <a:ext uri="{FF2B5EF4-FFF2-40B4-BE49-F238E27FC236}">
+                <a16:creationId xmlns:a16="http://schemas.microsoft.com/office/drawing/2014/main" id="{3E8C6F77-8D9E-5F13-1C39-952EE8924EF2}"/>
               </a:ext>
             </a:extLst>
           </p:cNvPr>
@@ -5351,17 +5346,12 @@
         </p:blipFill>
         <p:spPr>
           <a:xfrm>
-            <a:off x="211710" y="2183570"/>
-            <a:ext cx="8176489" cy="3935571"/>
+            <a:off x="102653" y="2159524"/>
+            <a:ext cx="8479296" cy="4015402"/>
           </a:xfrm>
           <a:prstGeom prst="rect">
             <a:avLst/>
           </a:prstGeom>
-          <a:ln>
-            <a:solidFill>
-              <a:schemeClr val="bg1"/>
-            </a:solidFill>
-          </a:ln>
         </p:spPr>
       </p:pic>
       <p:sp>
@@ -5418,41 +5408,6 @@
           </a:p>
         </p:txBody>
       </p:sp>
-      <p:pic>
-        <p:nvPicPr>
-          <p:cNvPr id="9" name="Imagem 8">
-            <a:extLst>
-              <a:ext uri="{FF2B5EF4-FFF2-40B4-BE49-F238E27FC236}">
-                <a16:creationId xmlns:a16="http://schemas.microsoft.com/office/drawing/2014/main" id="{C01733F4-99B9-9464-EA09-2DD70D6D6934}"/>
-              </a:ext>
-            </a:extLst>
-          </p:cNvPr>
-          <p:cNvPicPr>
-            <a:picLocks noChangeAspect="1"/>
-          </p:cNvPicPr>
-          <p:nvPr/>
-        </p:nvPicPr>
-        <p:blipFill>
-          <a:blip r:embed="rId3"/>
-          <a:stretch>
-            <a:fillRect/>
-          </a:stretch>
-        </p:blipFill>
-        <p:spPr>
-          <a:xfrm>
-            <a:off x="5913466" y="117446"/>
-            <a:ext cx="6050047" cy="4530055"/>
-          </a:xfrm>
-          <a:prstGeom prst="rect">
-            <a:avLst/>
-          </a:prstGeom>
-          <a:ln>
-            <a:solidFill>
-              <a:schemeClr val="bg1"/>
-            </a:solidFill>
-          </a:ln>
-        </p:spPr>
-      </p:pic>
       <p:cxnSp>
         <p:nvCxnSpPr>
           <p:cNvPr id="11" name="Conector de Seta Reta 10">
@@ -5497,6 +5452,41 @@
           </a:fontRef>
         </p:style>
       </p:cxnSp>
+      <p:pic>
+        <p:nvPicPr>
+          <p:cNvPr id="9" name="Imagem 8">
+            <a:extLst>
+              <a:ext uri="{FF2B5EF4-FFF2-40B4-BE49-F238E27FC236}">
+                <a16:creationId xmlns:a16="http://schemas.microsoft.com/office/drawing/2014/main" id="{C01733F4-99B9-9464-EA09-2DD70D6D6934}"/>
+              </a:ext>
+            </a:extLst>
+          </p:cNvPr>
+          <p:cNvPicPr>
+            <a:picLocks noChangeAspect="1"/>
+          </p:cNvPicPr>
+          <p:nvPr/>
+        </p:nvPicPr>
+        <p:blipFill>
+          <a:blip r:embed="rId3"/>
+          <a:stretch>
+            <a:fillRect/>
+          </a:stretch>
+        </p:blipFill>
+        <p:spPr>
+          <a:xfrm>
+            <a:off x="5913466" y="117446"/>
+            <a:ext cx="6050047" cy="4530055"/>
+          </a:xfrm>
+          <a:prstGeom prst="rect">
+            <a:avLst/>
+          </a:prstGeom>
+          <a:ln>
+            <a:solidFill>
+              <a:schemeClr val="bg1"/>
+            </a:solidFill>
+          </a:ln>
+        </p:spPr>
+      </p:pic>
     </p:spTree>
     <p:extLst>
       <p:ext uri="{BB962C8B-B14F-4D97-AF65-F5344CB8AC3E}">
@@ -6372,10 +6362,10 @@
       </p:cxnSp>
       <p:pic>
         <p:nvPicPr>
-          <p:cNvPr id="7" name="Imagem 6">
-            <a:extLst>
-              <a:ext uri="{FF2B5EF4-FFF2-40B4-BE49-F238E27FC236}">
-                <a16:creationId xmlns:a16="http://schemas.microsoft.com/office/drawing/2014/main" id="{38491AA9-5527-0536-23EB-EBBCB893D3C3}"/>
+          <p:cNvPr id="4" name="Imagem 3">
+            <a:extLst>
+              <a:ext uri="{FF2B5EF4-FFF2-40B4-BE49-F238E27FC236}">
+                <a16:creationId xmlns:a16="http://schemas.microsoft.com/office/drawing/2014/main" id="{F9916CED-E6C2-D6F5-25D5-51D2331E4389}"/>
               </a:ext>
             </a:extLst>
           </p:cNvPr>
@@ -6392,8 +6382,8 @@
         </p:blipFill>
         <p:spPr>
           <a:xfrm>
-            <a:off x="1839756" y="1905801"/>
-            <a:ext cx="8512487" cy="4648593"/>
+            <a:off x="1973001" y="1740724"/>
+            <a:ext cx="8242950" cy="4777164"/>
           </a:xfrm>
           <a:prstGeom prst="rect">
             <a:avLst/>

</xml_diff>